<commit_message>
feat: adjustments on presentation
</commit_message>
<xml_diff>
--- a/Apresentação Leonardo.pptx
+++ b/Apresentação Leonardo.pptx
@@ -6267,7 +6267,7 @@
             </a:pPr>
             <a:r>
               <a:rPr lang="pt-BR" sz="1700"/>
-              <a:t>Sistema de Gestão de locação para imobiliárias contendo features de Cadastro, Atualização, Pesquisa (Imóveis, Proprietários, Clientes, e Contratos de Locação (além de features que integrações);</a:t>
+              <a:t>Sistema de Gestão de locação para imobiliárias contendo features de Cadastro, Atualização, Pesquisa (Imóveis, Proprietários, Clientes e Contratos de Locação (além de features que se integram);</a:t>
             </a:r>
             <a:endParaRPr sz="1700"/>
           </a:p>
@@ -6976,7 +6976,7 @@
             </a:pPr>
             <a:r>
               <a:rPr lang="pt-BR" sz="1300"/>
-              <a:t>Visando a manutenção das páginas e seus elementos da página, visando o seu reuso e, também, um tempo menor em suas entregas, além de menor impacto no cliente final, </a:t>
+              <a:t>Visando a manutenção das páginas e seus elementos e, também, visando o seu reuso e, além de otimizar o tempo nas entregas, gerando menor impacto no cliente final, </a:t>
             </a:r>
             <a:r>
               <a:rPr lang="pt-BR" sz="1300"/>
@@ -7450,7 +7450,7 @@
         </p:spPr>
         <p:txBody>
           <a:bodyPr anchorCtr="0" anchor="t" bIns="91425" lIns="91425" spcFirstLastPara="1" rIns="91425" wrap="square" tIns="91425">
-            <a:normAutofit fontScale="47500" lnSpcReduction="20000"/>
+            <a:normAutofit fontScale="32500" lnSpcReduction="20000"/>
           </a:bodyPr>
           <a:lstStyle/>
           <a:p>
@@ -7485,34 +7485,34 @@
               <a:buNone/>
             </a:pPr>
             <a:r>
-              <a:rPr lang="pt-BR" sz="2700"/>
+              <a:rPr lang="pt-BR" sz="4000"/>
               <a:t>Aqui, podemos começar a citar as bibliotecas que estariam sendo utilizadas do próprio React e que nos auxiliam </a:t>
             </a:r>
             <a:r>
-              <a:rPr lang="pt-BR" sz="2700"/>
+              <a:rPr lang="pt-BR" sz="4000"/>
               <a:t>nesta</a:t>
             </a:r>
             <a:r>
-              <a:rPr lang="pt-BR" sz="2700"/>
+              <a:rPr lang="pt-BR" sz="4000"/>
               <a:t> demanda como, por exemplo, o </a:t>
             </a:r>
             <a:r>
-              <a:rPr b="1" lang="pt-BR" sz="2700"/>
+              <a:rPr b="1" lang="pt-BR" sz="4000"/>
               <a:t>Styled-Components</a:t>
             </a:r>
             <a:r>
-              <a:rPr lang="pt-BR" sz="2700"/>
+              <a:rPr lang="pt-BR" sz="4000"/>
               <a:t>, o </a:t>
             </a:r>
             <a:r>
-              <a:rPr b="1" lang="pt-BR" sz="2700"/>
+              <a:rPr b="1" lang="pt-BR" sz="4000"/>
               <a:t>Material-U</a:t>
             </a:r>
             <a:r>
-              <a:rPr lang="pt-BR" sz="2700"/>
+              <a:rPr lang="pt-BR" sz="4000"/>
               <a:t>I;</a:t>
             </a:r>
-            <a:endParaRPr sz="2700"/>
+            <a:endParaRPr sz="4000"/>
           </a:p>
           <a:p>
             <a:pPr indent="0" lvl="0" marL="0" marR="0" rtl="0" algn="just">
@@ -7530,7 +7530,7 @@
             <a:r>
               <a:t/>
             </a:r>
-            <a:endParaRPr sz="2700"/>
+            <a:endParaRPr sz="4000"/>
           </a:p>
           <a:p>
             <a:pPr indent="0" lvl="0" marL="0" marR="0" rtl="0" algn="just">
@@ -7546,34 +7546,42 @@
               <a:buNone/>
             </a:pPr>
             <a:r>
-              <a:rPr lang="pt-BR" sz="2700"/>
+              <a:rPr lang="pt-BR" sz="4000"/>
               <a:t>Poderíamos, também, em </a:t>
             </a:r>
             <a:r>
-              <a:rPr lang="pt-BR" sz="2700"/>
+              <a:rPr lang="pt-BR" sz="4000"/>
               <a:t>components</a:t>
             </a:r>
             <a:r>
-              <a:rPr lang="pt-BR" sz="2700"/>
+              <a:rPr lang="pt-BR" sz="4000"/>
               <a:t> que </a:t>
             </a:r>
             <a:r>
-              <a:rPr lang="pt-BR" sz="2700"/>
+              <a:rPr lang="pt-BR" sz="4000"/>
               <a:t>trabalham</a:t>
             </a:r>
             <a:r>
-              <a:rPr lang="pt-BR" sz="2700"/>
-              <a:t> com lógica, realiza-los utilizando </a:t>
-            </a:r>
-            <a:r>
-              <a:rPr b="1" lang="pt-BR" sz="2700"/>
+              <a:rPr lang="pt-BR" sz="4000"/>
+              <a:t> com lógica, </a:t>
+            </a:r>
+            <a:r>
+              <a:rPr lang="pt-BR" sz="4000"/>
+              <a:t>realizá</a:t>
+            </a:r>
+            <a:r>
+              <a:rPr lang="pt-BR" sz="4000"/>
+              <a:t>-los utilizando </a:t>
+            </a:r>
+            <a:r>
+              <a:rPr b="1" lang="pt-BR" sz="4000"/>
               <a:t>TDD</a:t>
             </a:r>
             <a:r>
-              <a:rPr lang="pt-BR" sz="2700"/>
-              <a:t>, aplicando testes durante o seu desenvolvimento;</a:t>
-            </a:r>
-            <a:endParaRPr sz="2700"/>
+              <a:rPr lang="pt-BR" sz="4000"/>
+              <a:t>, e aplicando os testes durante o seu desenvolvimento;</a:t>
+            </a:r>
+            <a:endParaRPr sz="4000"/>
           </a:p>
           <a:p>
             <a:pPr indent="0" lvl="0" marL="0" marR="0" rtl="0" algn="just">
@@ -7591,7 +7599,7 @@
             <a:r>
               <a:t/>
             </a:r>
-            <a:endParaRPr sz="2700"/>
+            <a:endParaRPr sz="4000"/>
           </a:p>
           <a:p>
             <a:pPr indent="0" lvl="0" marL="0" marR="0" rtl="0" algn="just">
@@ -7607,34 +7615,34 @@
               <a:buNone/>
             </a:pPr>
             <a:r>
-              <a:rPr lang="pt-BR" sz="2700"/>
+              <a:rPr lang="pt-BR" sz="4000"/>
               <a:t>Por fim, pensando na forma de padronização da equipe interna e visando sua melhor produtividade, </a:t>
             </a:r>
             <a:r>
-              <a:rPr lang="pt-BR" sz="2700"/>
+              <a:rPr lang="pt-BR" sz="4000"/>
               <a:t>poderíamos</a:t>
             </a:r>
             <a:r>
-              <a:rPr lang="pt-BR" sz="2700"/>
+              <a:rPr lang="pt-BR" sz="4000"/>
               <a:t> </a:t>
             </a:r>
             <a:r>
-              <a:rPr b="1" lang="pt-BR" sz="2700"/>
+              <a:rPr b="1" lang="pt-BR" sz="4000"/>
               <a:t>padronizar os commits</a:t>
             </a:r>
             <a:r>
-              <a:rPr lang="pt-BR" sz="2700"/>
-              <a:t> de cada component, o que facilitaria a identificar o que cada alteração está fazendo, além de </a:t>
-            </a:r>
-            <a:r>
-              <a:rPr b="1" lang="pt-BR" sz="2700"/>
+              <a:rPr lang="pt-BR" sz="4000"/>
+              <a:t> de cada component ou página dentro do projeto, o que facilitaria a identificar o que cada alteração está fazendo, além de </a:t>
+            </a:r>
+            <a:r>
+              <a:rPr b="1" lang="pt-BR" sz="4000"/>
               <a:t>adotarmos o git flow</a:t>
             </a:r>
             <a:r>
-              <a:rPr lang="pt-BR" sz="2700"/>
+              <a:rPr lang="pt-BR" sz="4000"/>
               <a:t> que auxiliaria em todas as etapas de desenvolvimento e correções;</a:t>
             </a:r>
-            <a:endParaRPr sz="2700"/>
+            <a:endParaRPr sz="4000"/>
           </a:p>
           <a:p>
             <a:pPr indent="0" lvl="0" marL="0" rtl="0" algn="l">

</xml_diff>